<commit_message>
slides1w: trivial edits for s11, proofs.tex: 3 typos
</commit_message>
<xml_diff>
--- a/spring11/slides11/slides1w.pptx
+++ b/spring11/slides11/slides1w.pptx
@@ -5759,13 +5759,13 @@
               <a:rPr lang="en-US" sz="1000" baseline="0" dirty="0" smtClean="0">
                 <a:latin typeface="Comic Sans MS" pitchFamily="66" charset="0"/>
               </a:rPr>
-              <a:t> 3</a:t>
+              <a:t> 2</a:t>
             </a:r>
             <a:r>
               <a:rPr lang="en-US" sz="1000" dirty="0" smtClean="0">
                 <a:latin typeface="Comic Sans MS" pitchFamily="66" charset="0"/>
               </a:rPr>
-              <a:t>,  2010</a:t>
+              <a:t>,  2011</a:t>
             </a:r>
             <a:endParaRPr lang="en-US" sz="1000" dirty="0">
               <a:latin typeface="Comic Sans MS" pitchFamily="66" charset="0"/>
@@ -5784,7 +5784,7 @@
         <p:spPr bwMode="auto">
           <a:xfrm>
             <a:off x="1061884" y="6552787"/>
-            <a:ext cx="1519604" cy="246221"/>
+            <a:ext cx="1499066" cy="246221"/>
           </a:xfrm>
           <a:prstGeom prst="rect">
             <a:avLst/>
@@ -5823,7 +5823,7 @@
               <a:rPr lang="en-US" sz="1000" dirty="0" smtClean="0">
                 <a:latin typeface="Comic Sans MS" pitchFamily="66" charset="0"/>
               </a:rPr>
-              <a:t>2010 </a:t>
+              <a:t>2011 </a:t>
             </a:r>
             <a:endParaRPr lang="en-US" sz="1000" dirty="0">
               <a:latin typeface="Comic Sans MS" pitchFamily="66" charset="0"/>
@@ -17681,29 +17681,8 @@
               <a:rPr lang="en-US" sz="3600" dirty="0" smtClean="0">
                 <a:latin typeface="Comic Sans MS" pitchFamily="66" charset="0"/>
               </a:rPr>
-              <a:t> Calculation is a risky </a:t>
-            </a:r>
-            <a:r>
-              <a:rPr lang="en-US" sz="3600" dirty="0" smtClean="0">
-                <a:latin typeface="Comic Sans MS" pitchFamily="66" charset="0"/>
-              </a:rPr>
-              <a:t>substitute for </a:t>
-            </a:r>
-            <a:r>
-              <a:rPr lang="en-US" sz="3600" dirty="0" smtClean="0">
-                <a:latin typeface="Comic Sans MS" pitchFamily="66" charset="0"/>
-              </a:rPr>
-              <a:t>   	understanding</a:t>
-            </a:r>
-            <a:r>
-              <a:rPr lang="en-US" sz="3600" dirty="0" smtClean="0">
-                <a:latin typeface="Comic Sans MS" pitchFamily="66" charset="0"/>
-              </a:rPr>
-              <a:t>.    </a:t>
-            </a:r>
-            <a:endParaRPr lang="en-US" sz="3600" dirty="0" smtClean="0">
-              <a:latin typeface="Comic Sans MS" pitchFamily="66" charset="0"/>
-            </a:endParaRPr>
+              <a:t> Calculation is a risky substitute for    	understanding.    </a:t>
+            </a:r>
           </a:p>
           <a:p>
             <a:pPr marL="514350" indent="-514350" algn="l">
@@ -17727,19 +17706,7 @@
               <a:rPr lang="en-US" sz="3600" dirty="0" smtClean="0">
                 <a:latin typeface="Comic Sans MS" pitchFamily="66" charset="0"/>
               </a:rPr>
-              <a:t> you </a:t>
-            </a:r>
-            <a:r>
-              <a:rPr lang="en-US" sz="3600" dirty="0" smtClean="0">
-                <a:latin typeface="Comic Sans MS" pitchFamily="66" charset="0"/>
-              </a:rPr>
-              <a:t>know the </a:t>
-            </a:r>
-            <a:r>
-              <a:rPr lang="en-US" sz="3600" dirty="0" smtClean="0">
-                <a:latin typeface="Comic Sans MS" pitchFamily="66" charset="0"/>
-              </a:rPr>
-              <a:t>rules.</a:t>
+              <a:t> you know the rules.</a:t>
             </a:r>
           </a:p>
           <a:p>
@@ -20398,7 +20365,13 @@
               <a:rPr lang="en-US" sz="4800" dirty="0" smtClean="0">
                 <a:latin typeface="Comic Sans MS" pitchFamily="66" charset="0"/>
               </a:rPr>
-              <a:t> Reading Comments</a:t>
+              <a:t> Email Reading </a:t>
+            </a:r>
+            <a:r>
+              <a:rPr lang="en-US" sz="4800" dirty="0" smtClean="0">
+                <a:latin typeface="Comic Sans MS" pitchFamily="66" charset="0"/>
+              </a:rPr>
+              <a:t>Comments</a:t>
             </a:r>
             <a:endParaRPr lang="en-US" sz="4800" dirty="0" smtClean="0">
               <a:solidFill>
@@ -20417,27 +20390,13 @@
               <a:rPr lang="en-US" sz="4800" dirty="0" smtClean="0">
                 <a:latin typeface="Comic Sans MS" pitchFamily="66" charset="0"/>
               </a:rPr>
-              <a:t>    -- using online system</a:t>
+              <a:t>   </a:t>
             </a:r>
             <a:r>
               <a:rPr lang="en-US" sz="4800" dirty="0" smtClean="0">
-                <a:solidFill>
-                  <a:schemeClr val="accent5">
-                    <a:lumMod val="50000"/>
-                  </a:schemeClr>
-                </a:solidFill>
                 <a:latin typeface="Comic Sans MS" pitchFamily="66" charset="0"/>
               </a:rPr>
-              <a:t> </a:t>
-            </a:r>
-            <a:r>
-              <a:rPr lang="en-US" sz="5400" dirty="0" smtClean="0">
-                <a:solidFill>
-                  <a:srgbClr val="077F15"/>
-                </a:solidFill>
-                <a:latin typeface="Comic Sans MS" pitchFamily="66" charset="0"/>
-              </a:rPr>
-              <a:t>NB</a:t>
+              <a:t> --due dates in tutor TP.2</a:t>
             </a:r>
             <a:endParaRPr lang="en-US" sz="4800" dirty="0">
               <a:solidFill>

</xml_diff>